<commit_message>
commit before pulling to office PC
</commit_message>
<xml_diff>
--- a/BOM/Presentation Ch-1.pptx
+++ b/BOM/Presentation Ch-1.pptx
@@ -287,7 +287,7 @@
             <a:fld id="{CE480D21-A166-4BCC-A5CC-D480426E7773}" type="datetimeFigureOut">
               <a:rPr lang="en-US" smtClean="0"/>
               <a:pPr/>
-              <a:t>1/28/2026</a:t>
+              <a:t>1/29/2026</a:t>
             </a:fld>
             <a:endParaRPr lang="en-US"/>
           </a:p>
@@ -1764,7 +1764,7 @@
             <a:fld id="{7E21883C-E333-4839-B1BA-70F65EEED004}" type="datetimeFigureOut">
               <a:rPr lang="en-US" smtClean="0"/>
               <a:pPr/>
-              <a:t>1/28/2026</a:t>
+              <a:t>1/29/2026</a:t>
             </a:fld>
             <a:endParaRPr lang="en-US"/>
           </a:p>
@@ -2065,7 +2065,7 @@
             <a:fld id="{7E21883C-E333-4839-B1BA-70F65EEED004}" type="datetimeFigureOut">
               <a:rPr lang="en-US" smtClean="0"/>
               <a:pPr/>
-              <a:t>1/28/2026</a:t>
+              <a:t>1/29/2026</a:t>
             </a:fld>
             <a:endParaRPr lang="en-US"/>
           </a:p>
@@ -2242,7 +2242,7 @@
             <a:fld id="{7E21883C-E333-4839-B1BA-70F65EEED004}" type="datetimeFigureOut">
               <a:rPr lang="en-US" smtClean="0"/>
               <a:pPr/>
-              <a:t>1/28/2026</a:t>
+              <a:t>1/29/2026</a:t>
             </a:fld>
             <a:endParaRPr lang="en-US"/>
           </a:p>
@@ -2409,7 +2409,7 @@
             <a:fld id="{7E21883C-E333-4839-B1BA-70F65EEED004}" type="datetimeFigureOut">
               <a:rPr lang="en-US" smtClean="0"/>
               <a:pPr/>
-              <a:t>1/28/2026</a:t>
+              <a:t>1/29/2026</a:t>
             </a:fld>
             <a:endParaRPr lang="en-US"/>
           </a:p>
@@ -2669,7 +2669,7 @@
             <a:fld id="{7E21883C-E333-4839-B1BA-70F65EEED004}" type="datetimeFigureOut">
               <a:rPr lang="en-US" smtClean="0"/>
               <a:pPr/>
-              <a:t>1/28/2026</a:t>
+              <a:t>1/29/2026</a:t>
             </a:fld>
             <a:endParaRPr lang="en-US"/>
           </a:p>
@@ -3123,7 +3123,7 @@
             <a:fld id="{7E21883C-E333-4839-B1BA-70F65EEED004}" type="datetimeFigureOut">
               <a:rPr lang="en-US" smtClean="0"/>
               <a:pPr/>
-              <a:t>1/28/2026</a:t>
+              <a:t>1/29/2026</a:t>
             </a:fld>
             <a:endParaRPr lang="en-US"/>
           </a:p>
@@ -3603,7 +3603,7 @@
             <a:fld id="{7E21883C-E333-4839-B1BA-70F65EEED004}" type="datetimeFigureOut">
               <a:rPr lang="en-US" smtClean="0"/>
               <a:pPr/>
-              <a:t>1/28/2026</a:t>
+              <a:t>1/29/2026</a:t>
             </a:fld>
             <a:endParaRPr lang="en-US"/>
           </a:p>
@@ -3723,7 +3723,7 @@
             <a:fld id="{7E21883C-E333-4839-B1BA-70F65EEED004}" type="datetimeFigureOut">
               <a:rPr lang="en-US" smtClean="0"/>
               <a:pPr/>
-              <a:t>1/28/2026</a:t>
+              <a:t>1/29/2026</a:t>
             </a:fld>
             <a:endParaRPr lang="en-US"/>
           </a:p>
@@ -3861,7 +3861,7 @@
             <a:fld id="{7E21883C-E333-4839-B1BA-70F65EEED004}" type="datetimeFigureOut">
               <a:rPr lang="en-US" smtClean="0"/>
               <a:pPr/>
-              <a:t>1/28/2026</a:t>
+              <a:t>1/29/2026</a:t>
             </a:fld>
             <a:endParaRPr lang="en-US"/>
           </a:p>
@@ -4174,7 +4174,7 @@
             <a:fld id="{7E21883C-E333-4839-B1BA-70F65EEED004}" type="datetimeFigureOut">
               <a:rPr lang="en-US" smtClean="0"/>
               <a:pPr/>
-              <a:t>1/28/2026</a:t>
+              <a:t>1/29/2026</a:t>
             </a:fld>
             <a:endParaRPr lang="en-US"/>
           </a:p>
@@ -4303,7 +4303,7 @@
             <a:fld id="{7E21883C-E333-4839-B1BA-70F65EEED004}" type="datetimeFigureOut">
               <a:rPr lang="en-US" smtClean="0"/>
               <a:pPr/>
-              <a:t>1/28/2026</a:t>
+              <a:t>1/29/2026</a:t>
             </a:fld>
             <a:endParaRPr lang="en-US"/>
           </a:p>
@@ -5061,7 +5061,7 @@
             <a:fld id="{7E21883C-E333-4839-B1BA-70F65EEED004}" type="datetimeFigureOut">
               <a:rPr lang="en-US" smtClean="0"/>
               <a:pPr/>
-              <a:t>1/28/2026</a:t>
+              <a:t>1/29/2026</a:t>
             </a:fld>
             <a:endParaRPr lang="en-US"/>
           </a:p>
@@ -5598,7 +5598,7 @@
             <a:pPr algn="ctr"/>
             <a:r>
               <a:rPr lang="en-US" b="1" dirty="0" smtClean="0"/>
-              <a:t>BASICS OF MANAGEMENT &amp; ENTREPRENEURSHIP DEVELOPMENT</a:t>
+              <a:t>BASICS OF MANAGEMENT </a:t>
             </a:r>
             <a:endParaRPr lang="en-US" dirty="0" smtClean="0"/>
           </a:p>
@@ -5692,7 +5692,13 @@
               <a:rPr lang="en-GB" sz="3200" dirty="0" smtClean="0">
                 <a:latin typeface="Adobe Caslon Pro" panose="0205050205050A020403" pitchFamily="18" charset="0"/>
               </a:rPr>
-              <a:t>(IT 5</a:t>
+              <a:t>(IT </a:t>
+            </a:r>
+            <a:r>
+              <a:rPr lang="en-GB" sz="3200" dirty="0" smtClean="0">
+                <a:latin typeface="Adobe Caslon Pro" panose="0205050205050A020403" pitchFamily="18" charset="0"/>
+              </a:rPr>
+              <a:t>6</a:t>
             </a:r>
             <a:r>
               <a:rPr lang="en-GB" sz="3200" baseline="30000" dirty="0" smtClean="0">
@@ -5704,7 +5710,13 @@
               <a:rPr lang="en-GB" sz="3200" dirty="0" smtClean="0">
                 <a:latin typeface="Adobe Caslon Pro" panose="0205050205050A020403" pitchFamily="18" charset="0"/>
               </a:rPr>
-              <a:t> Semester)</a:t>
+              <a:t> </a:t>
+            </a:r>
+            <a:r>
+              <a:rPr lang="en-GB" sz="3200" dirty="0" smtClean="0">
+                <a:latin typeface="Adobe Caslon Pro" panose="0205050205050A020403" pitchFamily="18" charset="0"/>
+              </a:rPr>
+              <a:t>Semester)</a:t>
             </a:r>
             <a:endParaRPr lang="en-US" sz="3200" dirty="0">
               <a:latin typeface="Adobe Caslon Pro" panose="0205050205050A020403" pitchFamily="18" charset="0"/>
@@ -6721,15 +6733,7 @@
           <a:p>
             <a:r>
               <a:rPr lang="en-US" sz="2000" b="1" dirty="0" smtClean="0"/>
-              <a:t>The </a:t>
-            </a:r>
-            <a:r>
-              <a:rPr lang="en-US" sz="2000" b="1" dirty="0" smtClean="0"/>
-              <a:t>Management Cycle (P-O-S-C-C</a:t>
-            </a:r>
-            <a:r>
-              <a:rPr lang="en-US" sz="2000" b="1" dirty="0" smtClean="0"/>
-              <a:t>):</a:t>
+              <a:t>The Management Cycle (P-O-S-C-C):</a:t>
             </a:r>
           </a:p>
           <a:p>
@@ -6806,11 +6810,7 @@
             </a:pPr>
             <a:r>
               <a:rPr lang="en-US" sz="2000" b="1" dirty="0" smtClean="0"/>
-              <a:t>Directing &amp; Controlling</a:t>
-            </a:r>
-            <a:r>
-              <a:rPr lang="en-US" sz="2000" b="1" dirty="0" smtClean="0"/>
-              <a:t>:</a:t>
+              <a:t>Directing &amp; Controlling:</a:t>
             </a:r>
             <a:r>
               <a:rPr lang="en-US" sz="2000" dirty="0" smtClean="0"/>
@@ -7721,11 +7721,7 @@
           <a:p>
             <a:r>
               <a:rPr lang="en-US" sz="2800" b="1" dirty="0" smtClean="0"/>
-              <a:t>Activity: "Plan a </a:t>
-            </a:r>
-            <a:r>
-              <a:rPr lang="en-US" sz="2800" b="1" dirty="0" smtClean="0"/>
-              <a:t>Trip“</a:t>
+              <a:t>Activity: "Plan a Trip“</a:t>
             </a:r>
           </a:p>
           <a:p>
@@ -8636,16 +8632,11 @@
               <a:rPr lang="en-US" sz="2400" dirty="0" smtClean="0"/>
               <a:t> </a:t>
             </a:r>
-            <a:endParaRPr lang="en-US" sz="2400" dirty="0" smtClean="0"/>
           </a:p>
           <a:p>
             <a:r>
               <a:rPr lang="en-US" sz="2400" dirty="0" smtClean="0"/>
-              <a:t>	</a:t>
-            </a:r>
-            <a:r>
-              <a:rPr lang="en-US" sz="2400" dirty="0" smtClean="0"/>
-              <a:t>				</a:t>
+              <a:t>					</a:t>
             </a:r>
             <a:r>
               <a:rPr lang="en-US" sz="2400" b="1" i="1" dirty="0" smtClean="0"/>
@@ -8685,11 +8676,6 @@
               </a:rPr>
               <a:t>The main purpose o staffing is to put right man on right job. </a:t>
             </a:r>
-            <a:endParaRPr lang="en-US" sz="2400" i="1" dirty="0" smtClean="0">
-              <a:solidFill>
-                <a:srgbClr val="C00000"/>
-              </a:solidFill>
-            </a:endParaRPr>
           </a:p>
           <a:p>
             <a:endParaRPr lang="en-US" dirty="0"/>
@@ -9101,7 +9087,6 @@
               <a:rPr lang="en-US" sz="2800" b="1" dirty="0" smtClean="0"/>
               <a:t>Coordinating</a:t>
             </a:r>
-            <a:endParaRPr lang="en-US" sz="2800" b="1" dirty="0" smtClean="0"/>
           </a:p>
           <a:p>
             <a:endParaRPr lang="en-US" sz="2800" dirty="0"/>
@@ -9109,11 +9094,7 @@
           <a:p>
             <a:r>
               <a:rPr lang="en-US" sz="2400" dirty="0" smtClean="0"/>
-              <a:t>Coordination is often called the "Essence of Management." It is not just a separate function but the force that binds all other functions (Planning, Organizing, Staffing, Directing/ Coordinating, Controlling) together</a:t>
-            </a:r>
-            <a:r>
-              <a:rPr lang="en-US" sz="2400" dirty="0" smtClean="0"/>
-              <a:t>.</a:t>
+              <a:t>Coordination is often called the "Essence of Management." It is not just a separate function but the force that binds all other functions (Planning, Organizing, Staffing, Directing/ Coordinating, Controlling) together.</a:t>
             </a:r>
           </a:p>
           <a:p>
@@ -9133,28 +9114,19 @@
               <a:rPr lang="en-US" sz="2400" b="1" dirty="0" smtClean="0"/>
               <a:t>, </a:t>
             </a:r>
-            <a:endParaRPr lang="en-US" sz="2400" b="1" dirty="0" smtClean="0"/>
           </a:p>
           <a:p>
             <a:pPr lvl="0"/>
             <a:r>
               <a:rPr lang="en-US" sz="2400" dirty="0" smtClean="0"/>
-              <a:t>	</a:t>
-            </a:r>
-            <a:r>
-              <a:rPr lang="en-US" sz="2400" dirty="0" smtClean="0"/>
-              <a:t>		</a:t>
+              <a:t>			</a:t>
             </a:r>
           </a:p>
           <a:p>
             <a:pPr lvl="0"/>
             <a:r>
               <a:rPr lang="en-US" sz="2400" i="1" dirty="0" smtClean="0"/>
-              <a:t>	</a:t>
-            </a:r>
-            <a:r>
-              <a:rPr lang="en-US" sz="2400" i="1" dirty="0" smtClean="0"/>
-              <a:t>	"</a:t>
+              <a:t>		"</a:t>
             </a:r>
             <a:r>
               <a:rPr lang="en-US" sz="2400" b="1" i="1" dirty="0" smtClean="0"/>
@@ -9326,7 +9298,6 @@
               <a:rPr lang="en-US" sz="2800" b="1" dirty="0" smtClean="0"/>
               <a:t>Coordinating</a:t>
             </a:r>
-            <a:endParaRPr lang="en-US" sz="2800" b="1" dirty="0" smtClean="0"/>
           </a:p>
           <a:p>
             <a:endParaRPr lang="en-IN" sz="2400" dirty="0" smtClean="0"/>
@@ -9335,11 +9306,7 @@
             <a:pPr lvl="0"/>
             <a:r>
               <a:rPr lang="en-US" sz="2400" b="1" dirty="0" smtClean="0"/>
-              <a:t>According to </a:t>
-            </a:r>
-            <a:r>
-              <a:rPr lang="en-US" sz="2400" b="1" dirty="0" smtClean="0"/>
-              <a:t>Mooney &amp; </a:t>
+              <a:t>According to Mooney &amp; </a:t>
             </a:r>
             <a:r>
               <a:rPr lang="en-US" sz="2400" b="1" dirty="0" err="1" smtClean="0"/>
@@ -9349,7 +9316,6 @@
               <a:rPr lang="en-US" sz="2400" b="1" dirty="0" smtClean="0"/>
               <a:t>,</a:t>
             </a:r>
-            <a:endParaRPr lang="en-US" sz="2400" b="1" dirty="0" smtClean="0"/>
           </a:p>
           <a:p>
             <a:r>
@@ -9358,11 +9324,7 @@
             </a:r>
             <a:r>
               <a:rPr lang="en-US" sz="2400" b="1" i="1" dirty="0" smtClean="0"/>
-              <a:t>"</a:t>
-            </a:r>
-            <a:r>
-              <a:rPr lang="en-US" sz="2400" b="1" i="1" dirty="0" smtClean="0"/>
-              <a:t>Coordination is the orderly arrangement of group effort to provide unity of action in the pursuit of a common purpose."</a:t>
+              <a:t>"Coordination is the orderly arrangement of group effort to provide unity of action in the pursuit of a common purpose."</a:t>
             </a:r>
           </a:p>
           <a:p>
@@ -9375,11 +9337,7 @@
             </a:pPr>
             <a:r>
               <a:rPr lang="en-US" sz="2400" dirty="0" smtClean="0"/>
-              <a:t> Coordination is basically a process </a:t>
-            </a:r>
-            <a:r>
-              <a:rPr lang="en-US" sz="2400" dirty="0" smtClean="0"/>
-              <a:t>of </a:t>
+              <a:t> Coordination is basically a process of </a:t>
             </a:r>
             <a:r>
               <a:rPr lang="en-US" sz="2400" b="1" dirty="0" smtClean="0"/>
@@ -9389,16 +9347,11 @@
               <a:rPr lang="en-US" sz="2400" dirty="0" smtClean="0"/>
               <a:t>. </a:t>
             </a:r>
-            <a:endParaRPr lang="en-US" sz="2400" dirty="0" smtClean="0"/>
           </a:p>
           <a:p>
             <a:r>
               <a:rPr lang="en-US" sz="2400" dirty="0" smtClean="0"/>
-              <a:t>It </a:t>
-            </a:r>
-            <a:r>
-              <a:rPr lang="en-US" sz="2400" dirty="0" smtClean="0"/>
-              <a:t>involves:</a:t>
+              <a:t>It involves:</a:t>
             </a:r>
           </a:p>
           <a:p>
@@ -9440,11 +9393,7 @@
             </a:r>
             <a:r>
               <a:rPr lang="en-US" sz="2200" dirty="0" smtClean="0"/>
-              <a:t> combining separate efforts into a single outcome</a:t>
-            </a:r>
-            <a:r>
-              <a:rPr lang="en-US" sz="2200" dirty="0" smtClean="0"/>
-              <a:t>.</a:t>
+              <a:t> combining separate efforts into a single outcome.</a:t>
             </a:r>
           </a:p>
         </p:txBody>
@@ -9663,11 +9612,7 @@
             </a:r>
             <a:r>
               <a:rPr lang="en-US" sz="2000" dirty="0" smtClean="0"/>
-              <a:t> As you will learn in Unit 5, quality requires every stage of production to be perfect. Coordination ensures that the quality standards set in the planning stage are actually met on the production floor</a:t>
-            </a:r>
-            <a:r>
-              <a:rPr lang="en-US" sz="2000" dirty="0" smtClean="0"/>
-              <a:t>.</a:t>
+              <a:t> As you will learn in Unit 5, quality requires every stage of production to be perfect. Coordination ensures that the quality standards set in the planning stage are actually met on the production floor.</a:t>
             </a:r>
           </a:p>
           <a:p>
@@ -9872,11 +9817,7 @@
             </a:r>
             <a:r>
               <a:rPr lang="en-US" sz="2400" dirty="0" smtClean="0"/>
-              <a:t>The </a:t>
-            </a:r>
-            <a:r>
-              <a:rPr lang="en-US" sz="2400" dirty="0" smtClean="0"/>
-              <a:t>manager must ensure that instructions are understood clearly.</a:t>
+              <a:t>The manager must ensure that instructions are understood clearly.</a:t>
             </a:r>
           </a:p>
           <a:p>
@@ -9886,23 +9827,11 @@
             </a:pPr>
             <a:r>
               <a:rPr lang="en-US" sz="2400" b="1" dirty="0" smtClean="0"/>
-              <a:t>Standard </a:t>
-            </a:r>
-            <a:r>
-              <a:rPr lang="en-US" sz="2400" b="1" dirty="0" smtClean="0"/>
-              <a:t>Operating Procedures (SOPs</a:t>
-            </a:r>
-            <a:r>
-              <a:rPr lang="en-US" sz="2400" b="1" dirty="0" smtClean="0"/>
-              <a:t>): </a:t>
+              <a:t>Standard Operating Procedures (SOPs): </a:t>
             </a:r>
             <a:r>
               <a:rPr lang="en-US" sz="2400" dirty="0" smtClean="0"/>
-              <a:t>Written </a:t>
-            </a:r>
-            <a:r>
-              <a:rPr lang="en-US" sz="2400" dirty="0" smtClean="0"/>
-              <a:t>rules that tell everyone exactly what to do in routine situations. This reduces confusion.</a:t>
+              <a:t>Written rules that tell everyone exactly what to do in routine situations. This reduces confusion.</a:t>
             </a:r>
           </a:p>
           <a:p>
@@ -9916,11 +9845,7 @@
             </a:r>
             <a:r>
               <a:rPr lang="en-US" sz="2400" dirty="0" smtClean="0"/>
-              <a:t>Face-to-face </a:t>
-            </a:r>
-            <a:r>
-              <a:rPr lang="en-US" sz="2400" dirty="0" smtClean="0"/>
-              <a:t>discussions to resolve conflicts and update progress.</a:t>
+              <a:t>Face-to-face discussions to resolve conflicts and update progress.</a:t>
             </a:r>
           </a:p>
           <a:p>
@@ -9930,23 +9855,11 @@
             </a:pPr>
             <a:r>
               <a:rPr lang="en-US" sz="2400" b="1" dirty="0" smtClean="0"/>
-              <a:t>Use </a:t>
-            </a:r>
-            <a:r>
-              <a:rPr lang="en-US" sz="2400" b="1" dirty="0" smtClean="0"/>
-              <a:t>of </a:t>
-            </a:r>
-            <a:r>
-              <a:rPr lang="en-US" sz="2400" b="1" dirty="0" smtClean="0"/>
-              <a:t>Committees: </a:t>
+              <a:t>Use of Committees: </a:t>
             </a:r>
             <a:r>
               <a:rPr lang="en-US" sz="2400" dirty="0" smtClean="0"/>
-              <a:t>Groups </a:t>
-            </a:r>
-            <a:r>
-              <a:rPr lang="en-US" sz="2400" dirty="0" smtClean="0"/>
-              <a:t>created to handle specific problems involving multiple departments.</a:t>
+              <a:t>Groups created to handle specific problems involving multiple departments.</a:t>
             </a:r>
           </a:p>
           <a:p>
@@ -10141,7 +10054,6 @@
               <a:rPr lang="en-US" sz="2400" b="1" dirty="0" smtClean="0"/>
               <a:t>Directing</a:t>
             </a:r>
-            <a:endParaRPr lang="en-US" sz="2400" b="1" dirty="0" smtClean="0"/>
           </a:p>
           <a:p>
             <a:endParaRPr lang="en-US" sz="2400" dirty="0"/>
@@ -10668,19 +10580,11 @@
           <a:p>
             <a:r>
               <a:rPr lang="en-US" sz="2400" b="1" dirty="0" smtClean="0"/>
-              <a:t>	</a:t>
-            </a:r>
-            <a:r>
-              <a:rPr lang="en-US" sz="2400" b="1" dirty="0" smtClean="0"/>
-              <a:t>			</a:t>
+              <a:t>				</a:t>
             </a:r>
             <a:r>
               <a:rPr lang="en-US" sz="2400" b="1" i="1" dirty="0" smtClean="0"/>
-              <a:t> </a:t>
-            </a:r>
-            <a:r>
-              <a:rPr lang="en-US" sz="2400" b="1" i="1" dirty="0" smtClean="0"/>
-              <a:t>“</a:t>
+              <a:t> “</a:t>
             </a:r>
             <a:r>
               <a:rPr lang="en-US" sz="2400" b="1" i="1" dirty="0"/>
@@ -11074,16 +10978,11 @@
               <a:rPr lang="en-US" sz="2400" b="1" dirty="0" smtClean="0"/>
               <a:t> </a:t>
             </a:r>
-            <a:endParaRPr lang="en-US" sz="2400" b="1" dirty="0" smtClean="0"/>
           </a:p>
           <a:p>
             <a:r>
               <a:rPr lang="en-US" sz="2400" b="1" dirty="0" smtClean="0"/>
-              <a:t>	</a:t>
-            </a:r>
-            <a:r>
-              <a:rPr lang="en-US" sz="2400" b="1" dirty="0" smtClean="0"/>
-              <a:t>			</a:t>
+              <a:t>				</a:t>
             </a:r>
             <a:r>
               <a:rPr lang="en-US" sz="2400" b="1" i="1" dirty="0" smtClean="0"/>
@@ -11105,31 +11004,7 @@
                   <a:srgbClr val="C00000"/>
                 </a:solidFill>
               </a:rPr>
-              <a:t>The purpose of controlling is to ensure that everything occurs in conformities with the </a:t>
-            </a:r>
-            <a:r>
-              <a:rPr lang="en-US" sz="2400" dirty="0" smtClean="0">
-                <a:solidFill>
-                  <a:srgbClr val="C00000"/>
-                </a:solidFill>
-              </a:rPr>
-              <a:t>standards.  An </a:t>
-            </a:r>
-            <a:r>
-              <a:rPr lang="en-US" sz="2400" dirty="0" smtClean="0">
-                <a:solidFill>
-                  <a:srgbClr val="C00000"/>
-                </a:solidFill>
-              </a:rPr>
-              <a:t>efficient system of control helps to predict deviations before they actually occur</a:t>
-            </a:r>
-            <a:r>
-              <a:rPr lang="en-US" sz="2400" dirty="0" smtClean="0">
-                <a:solidFill>
-                  <a:srgbClr val="C00000"/>
-                </a:solidFill>
-              </a:rPr>
-              <a:t>.</a:t>
+              <a:t>The purpose of controlling is to ensure that everything occurs in conformities with the standards.  An efficient system of control helps to predict deviations before they actually occur.</a:t>
             </a:r>
           </a:p>
           <a:p>
@@ -11331,11 +11206,7 @@
             </a:r>
             <a:r>
               <a:rPr lang="en-US" sz="2400" b="1" i="1" dirty="0" smtClean="0"/>
-              <a:t>performance </a:t>
-            </a:r>
-            <a:r>
-              <a:rPr lang="en-US" sz="2400" b="1" i="1" dirty="0" smtClean="0"/>
-              <a:t>standards.</a:t>
+              <a:t>performance standards.</a:t>
             </a:r>
             <a:endParaRPr lang="en-US" sz="2400" b="1" i="1" dirty="0"/>
           </a:p>
@@ -11541,15 +11412,7 @@
           <a:p>
             <a:r>
               <a:rPr lang="en-US" sz="2400" b="1" dirty="0" smtClean="0"/>
-              <a:t>The </a:t>
-            </a:r>
-            <a:r>
-              <a:rPr lang="en-US" sz="2400" b="1" dirty="0" smtClean="0"/>
-              <a:t>Control Process (Example: Road Construction</a:t>
-            </a:r>
-            <a:r>
-              <a:rPr lang="en-US" sz="2400" b="1" dirty="0" smtClean="0"/>
-              <a:t>):</a:t>
+              <a:t>The Control Process (Example: Road Construction):</a:t>
             </a:r>
           </a:p>
           <a:p>
@@ -13919,11 +13782,7 @@
           <a:p>
             <a:r>
               <a:rPr lang="en-US" sz="2400" b="1" dirty="0" smtClean="0"/>
-              <a:t>1. Factory </a:t>
-            </a:r>
-            <a:r>
-              <a:rPr lang="en-US" sz="2400" b="1" dirty="0" smtClean="0"/>
-              <a:t>Division:</a:t>
+              <a:t>1. Factory Division:</a:t>
             </a:r>
           </a:p>
           <a:p>
@@ -14170,11 +14029,7 @@
           <a:p>
             <a:r>
               <a:rPr lang="en-US" sz="2400" dirty="0" smtClean="0"/>
-              <a:t>(iv) The shop disciplinarian</a:t>
-            </a:r>
-            <a:r>
-              <a:rPr lang="en-US" sz="2400" dirty="0" smtClean="0"/>
-              <a:t>.</a:t>
+              <a:t>(iv) The shop disciplinarian.</a:t>
             </a:r>
           </a:p>
           <a:p>

</xml_diff>